<commit_message>
bootcamp day 2 update
</commit_message>
<xml_diff>
--- a/5.fraser.paper/PIN.KaKs/match-demo/match-function.pptx
+++ b/5.fraser.paper/PIN.KaKs/match-demo/match-function.pptx
@@ -165,10 +165,9 @@
           <a:lstStyle/>
           <a:p>
             <a:r>
-              <a:rPr lang="en-US" smtClean="0"/>
+              <a:rPr lang="en-US"/>
               <a:t>Click to edit Master title style</a:t>
             </a:r>
-            <a:endParaRPr lang="en-US"/>
           </a:p>
         </p:txBody>
       </p:sp>
@@ -284,10 +283,9 @@
           </a:lstStyle>
           <a:p>
             <a:r>
-              <a:rPr lang="en-US" smtClean="0"/>
+              <a:rPr lang="en-US"/>
               <a:t>Click to edit Master subtitle style</a:t>
             </a:r>
-            <a:endParaRPr lang="en-US"/>
           </a:p>
         </p:txBody>
       </p:sp>
@@ -309,7 +307,7 @@
             <a:fld id="{D116347B-99F7-7648-82D0-435612AEDE7B}" type="datetimeFigureOut">
               <a:rPr lang="en-US" smtClean="0"/>
               <a:pPr/>
-              <a:t>10/3/17</a:t>
+              <a:t>7/30/19</a:t>
             </a:fld>
             <a:endParaRPr lang="en-US"/>
           </a:p>
@@ -399,10 +397,9 @@
           <a:lstStyle/>
           <a:p>
             <a:r>
-              <a:rPr lang="en-US" smtClean="0"/>
+              <a:rPr lang="en-US"/>
               <a:t>Click to edit Master title style</a:t>
             </a:r>
-            <a:endParaRPr lang="en-US"/>
           </a:p>
         </p:txBody>
       </p:sp>
@@ -423,38 +420,37 @@
           <a:p>
             <a:pPr lvl="0"/>
             <a:r>
-              <a:rPr lang="en-US" smtClean="0"/>
+              <a:rPr lang="en-US"/>
               <a:t>Click to edit Master text styles</a:t>
             </a:r>
           </a:p>
           <a:p>
             <a:pPr lvl="1"/>
             <a:r>
-              <a:rPr lang="en-US" smtClean="0"/>
+              <a:rPr lang="en-US"/>
               <a:t>Second level</a:t>
             </a:r>
           </a:p>
           <a:p>
             <a:pPr lvl="2"/>
             <a:r>
-              <a:rPr lang="en-US" smtClean="0"/>
+              <a:rPr lang="en-US"/>
               <a:t>Third level</a:t>
             </a:r>
           </a:p>
           <a:p>
             <a:pPr lvl="3"/>
             <a:r>
-              <a:rPr lang="en-US" smtClean="0"/>
+              <a:rPr lang="en-US"/>
               <a:t>Fourth level</a:t>
             </a:r>
           </a:p>
           <a:p>
             <a:pPr lvl="4"/>
             <a:r>
-              <a:rPr lang="en-US" smtClean="0"/>
+              <a:rPr lang="en-US"/>
               <a:t>Fifth level</a:t>
             </a:r>
-            <a:endParaRPr lang="en-US"/>
           </a:p>
         </p:txBody>
       </p:sp>
@@ -476,7 +472,7 @@
             <a:fld id="{D116347B-99F7-7648-82D0-435612AEDE7B}" type="datetimeFigureOut">
               <a:rPr lang="en-US" smtClean="0"/>
               <a:pPr/>
-              <a:t>10/3/17</a:t>
+              <a:t>7/30/19</a:t>
             </a:fld>
             <a:endParaRPr lang="en-US"/>
           </a:p>
@@ -571,10 +567,9 @@
           <a:lstStyle/>
           <a:p>
             <a:r>
-              <a:rPr lang="en-US" smtClean="0"/>
+              <a:rPr lang="en-US"/>
               <a:t>Click to edit Master title style</a:t>
             </a:r>
-            <a:endParaRPr lang="en-US"/>
           </a:p>
         </p:txBody>
       </p:sp>
@@ -600,38 +595,37 @@
           <a:p>
             <a:pPr lvl="0"/>
             <a:r>
-              <a:rPr lang="en-US" smtClean="0"/>
+              <a:rPr lang="en-US"/>
               <a:t>Click to edit Master text styles</a:t>
             </a:r>
           </a:p>
           <a:p>
             <a:pPr lvl="1"/>
             <a:r>
-              <a:rPr lang="en-US" smtClean="0"/>
+              <a:rPr lang="en-US"/>
               <a:t>Second level</a:t>
             </a:r>
           </a:p>
           <a:p>
             <a:pPr lvl="2"/>
             <a:r>
-              <a:rPr lang="en-US" smtClean="0"/>
+              <a:rPr lang="en-US"/>
               <a:t>Third level</a:t>
             </a:r>
           </a:p>
           <a:p>
             <a:pPr lvl="3"/>
             <a:r>
-              <a:rPr lang="en-US" smtClean="0"/>
+              <a:rPr lang="en-US"/>
               <a:t>Fourth level</a:t>
             </a:r>
           </a:p>
           <a:p>
             <a:pPr lvl="4"/>
             <a:r>
-              <a:rPr lang="en-US" smtClean="0"/>
+              <a:rPr lang="en-US"/>
               <a:t>Fifth level</a:t>
             </a:r>
-            <a:endParaRPr lang="en-US"/>
           </a:p>
         </p:txBody>
       </p:sp>
@@ -653,7 +647,7 @@
             <a:fld id="{D116347B-99F7-7648-82D0-435612AEDE7B}" type="datetimeFigureOut">
               <a:rPr lang="en-US" smtClean="0"/>
               <a:pPr/>
-              <a:t>10/3/17</a:t>
+              <a:t>7/30/19</a:t>
             </a:fld>
             <a:endParaRPr lang="en-US"/>
           </a:p>
@@ -743,10 +737,9 @@
           <a:lstStyle/>
           <a:p>
             <a:r>
-              <a:rPr lang="en-US" smtClean="0"/>
+              <a:rPr lang="en-US"/>
               <a:t>Click to edit Master title style</a:t>
             </a:r>
-            <a:endParaRPr lang="en-US"/>
           </a:p>
         </p:txBody>
       </p:sp>
@@ -767,38 +760,37 @@
           <a:p>
             <a:pPr lvl="0"/>
             <a:r>
-              <a:rPr lang="en-US" smtClean="0"/>
+              <a:rPr lang="en-US"/>
               <a:t>Click to edit Master text styles</a:t>
             </a:r>
           </a:p>
           <a:p>
             <a:pPr lvl="1"/>
             <a:r>
-              <a:rPr lang="en-US" smtClean="0"/>
+              <a:rPr lang="en-US"/>
               <a:t>Second level</a:t>
             </a:r>
           </a:p>
           <a:p>
             <a:pPr lvl="2"/>
             <a:r>
-              <a:rPr lang="en-US" smtClean="0"/>
+              <a:rPr lang="en-US"/>
               <a:t>Third level</a:t>
             </a:r>
           </a:p>
           <a:p>
             <a:pPr lvl="3"/>
             <a:r>
-              <a:rPr lang="en-US" smtClean="0"/>
+              <a:rPr lang="en-US"/>
               <a:t>Fourth level</a:t>
             </a:r>
           </a:p>
           <a:p>
             <a:pPr lvl="4"/>
             <a:r>
-              <a:rPr lang="en-US" smtClean="0"/>
+              <a:rPr lang="en-US"/>
               <a:t>Fifth level</a:t>
             </a:r>
-            <a:endParaRPr lang="en-US"/>
           </a:p>
         </p:txBody>
       </p:sp>
@@ -820,7 +812,7 @@
             <a:fld id="{D116347B-99F7-7648-82D0-435612AEDE7B}" type="datetimeFigureOut">
               <a:rPr lang="en-US" smtClean="0"/>
               <a:pPr/>
-              <a:t>10/3/17</a:t>
+              <a:t>7/30/19</a:t>
             </a:fld>
             <a:endParaRPr lang="en-US"/>
           </a:p>
@@ -919,10 +911,9 @@
           </a:lstStyle>
           <a:p>
             <a:r>
-              <a:rPr lang="en-US" smtClean="0"/>
+              <a:rPr lang="en-US"/>
               <a:t>Click to edit Master title style</a:t>
             </a:r>
-            <a:endParaRPr lang="en-US"/>
           </a:p>
         </p:txBody>
       </p:sp>
@@ -1039,7 +1030,7 @@
           <a:p>
             <a:pPr lvl="0"/>
             <a:r>
-              <a:rPr lang="en-US" smtClean="0"/>
+              <a:rPr lang="en-US"/>
               <a:t>Click to edit Master text styles</a:t>
             </a:r>
           </a:p>
@@ -1063,7 +1054,7 @@
             <a:fld id="{D116347B-99F7-7648-82D0-435612AEDE7B}" type="datetimeFigureOut">
               <a:rPr lang="en-US" smtClean="0"/>
               <a:pPr/>
-              <a:t>10/3/17</a:t>
+              <a:t>7/30/19</a:t>
             </a:fld>
             <a:endParaRPr lang="en-US"/>
           </a:p>
@@ -1153,10 +1144,9 @@
           <a:lstStyle/>
           <a:p>
             <a:r>
-              <a:rPr lang="en-US" smtClean="0"/>
+              <a:rPr lang="en-US"/>
               <a:t>Click to edit Master title style</a:t>
             </a:r>
-            <a:endParaRPr lang="en-US"/>
           </a:p>
         </p:txBody>
       </p:sp>
@@ -1210,38 +1200,37 @@
           <a:p>
             <a:pPr lvl="0"/>
             <a:r>
-              <a:rPr lang="en-US" smtClean="0"/>
+              <a:rPr lang="en-US"/>
               <a:t>Click to edit Master text styles</a:t>
             </a:r>
           </a:p>
           <a:p>
             <a:pPr lvl="1"/>
             <a:r>
-              <a:rPr lang="en-US" smtClean="0"/>
+              <a:rPr lang="en-US"/>
               <a:t>Second level</a:t>
             </a:r>
           </a:p>
           <a:p>
             <a:pPr lvl="2"/>
             <a:r>
-              <a:rPr lang="en-US" smtClean="0"/>
+              <a:rPr lang="en-US"/>
               <a:t>Third level</a:t>
             </a:r>
           </a:p>
           <a:p>
             <a:pPr lvl="3"/>
             <a:r>
-              <a:rPr lang="en-US" smtClean="0"/>
+              <a:rPr lang="en-US"/>
               <a:t>Fourth level</a:t>
             </a:r>
           </a:p>
           <a:p>
             <a:pPr lvl="4"/>
             <a:r>
-              <a:rPr lang="en-US" smtClean="0"/>
+              <a:rPr lang="en-US"/>
               <a:t>Fifth level</a:t>
             </a:r>
-            <a:endParaRPr lang="en-US"/>
           </a:p>
         </p:txBody>
       </p:sp>
@@ -1295,38 +1284,37 @@
           <a:p>
             <a:pPr lvl="0"/>
             <a:r>
-              <a:rPr lang="en-US" smtClean="0"/>
+              <a:rPr lang="en-US"/>
               <a:t>Click to edit Master text styles</a:t>
             </a:r>
           </a:p>
           <a:p>
             <a:pPr lvl="1"/>
             <a:r>
-              <a:rPr lang="en-US" smtClean="0"/>
+              <a:rPr lang="en-US"/>
               <a:t>Second level</a:t>
             </a:r>
           </a:p>
           <a:p>
             <a:pPr lvl="2"/>
             <a:r>
-              <a:rPr lang="en-US" smtClean="0"/>
+              <a:rPr lang="en-US"/>
               <a:t>Third level</a:t>
             </a:r>
           </a:p>
           <a:p>
             <a:pPr lvl="3"/>
             <a:r>
-              <a:rPr lang="en-US" smtClean="0"/>
+              <a:rPr lang="en-US"/>
               <a:t>Fourth level</a:t>
             </a:r>
           </a:p>
           <a:p>
             <a:pPr lvl="4"/>
             <a:r>
-              <a:rPr lang="en-US" smtClean="0"/>
+              <a:rPr lang="en-US"/>
               <a:t>Fifth level</a:t>
             </a:r>
-            <a:endParaRPr lang="en-US"/>
           </a:p>
         </p:txBody>
       </p:sp>
@@ -1348,7 +1336,7 @@
             <a:fld id="{D116347B-99F7-7648-82D0-435612AEDE7B}" type="datetimeFigureOut">
               <a:rPr lang="en-US" smtClean="0"/>
               <a:pPr/>
-              <a:t>10/3/17</a:t>
+              <a:t>7/30/19</a:t>
             </a:fld>
             <a:endParaRPr lang="en-US"/>
           </a:p>
@@ -1442,10 +1430,9 @@
           </a:lstStyle>
           <a:p>
             <a:r>
-              <a:rPr lang="en-US" smtClean="0"/>
+              <a:rPr lang="en-US"/>
               <a:t>Click to edit Master title style</a:t>
             </a:r>
-            <a:endParaRPr lang="en-US"/>
           </a:p>
         </p:txBody>
       </p:sp>
@@ -1508,7 +1495,7 @@
           <a:p>
             <a:pPr lvl="0"/>
             <a:r>
-              <a:rPr lang="en-US" smtClean="0"/>
+              <a:rPr lang="en-US"/>
               <a:t>Click to edit Master text styles</a:t>
             </a:r>
           </a:p>
@@ -1564,38 +1551,37 @@
           <a:p>
             <a:pPr lvl="0"/>
             <a:r>
-              <a:rPr lang="en-US" smtClean="0"/>
+              <a:rPr lang="en-US"/>
               <a:t>Click to edit Master text styles</a:t>
             </a:r>
           </a:p>
           <a:p>
             <a:pPr lvl="1"/>
             <a:r>
-              <a:rPr lang="en-US" smtClean="0"/>
+              <a:rPr lang="en-US"/>
               <a:t>Second level</a:t>
             </a:r>
           </a:p>
           <a:p>
             <a:pPr lvl="2"/>
             <a:r>
-              <a:rPr lang="en-US" smtClean="0"/>
+              <a:rPr lang="en-US"/>
               <a:t>Third level</a:t>
             </a:r>
           </a:p>
           <a:p>
             <a:pPr lvl="3"/>
             <a:r>
-              <a:rPr lang="en-US" smtClean="0"/>
+              <a:rPr lang="en-US"/>
               <a:t>Fourth level</a:t>
             </a:r>
           </a:p>
           <a:p>
             <a:pPr lvl="4"/>
             <a:r>
-              <a:rPr lang="en-US" smtClean="0"/>
+              <a:rPr lang="en-US"/>
               <a:t>Fifth level</a:t>
             </a:r>
-            <a:endParaRPr lang="en-US"/>
           </a:p>
         </p:txBody>
       </p:sp>
@@ -1658,7 +1644,7 @@
           <a:p>
             <a:pPr lvl="0"/>
             <a:r>
-              <a:rPr lang="en-US" smtClean="0"/>
+              <a:rPr lang="en-US"/>
               <a:t>Click to edit Master text styles</a:t>
             </a:r>
           </a:p>
@@ -1714,38 +1700,37 @@
           <a:p>
             <a:pPr lvl="0"/>
             <a:r>
-              <a:rPr lang="en-US" smtClean="0"/>
+              <a:rPr lang="en-US"/>
               <a:t>Click to edit Master text styles</a:t>
             </a:r>
           </a:p>
           <a:p>
             <a:pPr lvl="1"/>
             <a:r>
-              <a:rPr lang="en-US" smtClean="0"/>
+              <a:rPr lang="en-US"/>
               <a:t>Second level</a:t>
             </a:r>
           </a:p>
           <a:p>
             <a:pPr lvl="2"/>
             <a:r>
-              <a:rPr lang="en-US" smtClean="0"/>
+              <a:rPr lang="en-US"/>
               <a:t>Third level</a:t>
             </a:r>
           </a:p>
           <a:p>
             <a:pPr lvl="3"/>
             <a:r>
-              <a:rPr lang="en-US" smtClean="0"/>
+              <a:rPr lang="en-US"/>
               <a:t>Fourth level</a:t>
             </a:r>
           </a:p>
           <a:p>
             <a:pPr lvl="4"/>
             <a:r>
-              <a:rPr lang="en-US" smtClean="0"/>
+              <a:rPr lang="en-US"/>
               <a:t>Fifth level</a:t>
             </a:r>
-            <a:endParaRPr lang="en-US"/>
           </a:p>
         </p:txBody>
       </p:sp>
@@ -1767,7 +1752,7 @@
             <a:fld id="{D116347B-99F7-7648-82D0-435612AEDE7B}" type="datetimeFigureOut">
               <a:rPr lang="en-US" smtClean="0"/>
               <a:pPr/>
-              <a:t>10/3/17</a:t>
+              <a:t>7/30/19</a:t>
             </a:fld>
             <a:endParaRPr lang="en-US"/>
           </a:p>
@@ -1857,10 +1842,9 @@
           <a:lstStyle/>
           <a:p>
             <a:r>
-              <a:rPr lang="en-US" smtClean="0"/>
+              <a:rPr lang="en-US"/>
               <a:t>Click to edit Master title style</a:t>
             </a:r>
-            <a:endParaRPr lang="en-US"/>
           </a:p>
         </p:txBody>
       </p:sp>
@@ -1882,7 +1866,7 @@
             <a:fld id="{D116347B-99F7-7648-82D0-435612AEDE7B}" type="datetimeFigureOut">
               <a:rPr lang="en-US" smtClean="0"/>
               <a:pPr/>
-              <a:t>10/3/17</a:t>
+              <a:t>7/30/19</a:t>
             </a:fld>
             <a:endParaRPr lang="en-US"/>
           </a:p>
@@ -1974,7 +1958,7 @@
             <a:fld id="{D116347B-99F7-7648-82D0-435612AEDE7B}" type="datetimeFigureOut">
               <a:rPr lang="en-US" smtClean="0"/>
               <a:pPr/>
-              <a:t>10/3/17</a:t>
+              <a:t>7/30/19</a:t>
             </a:fld>
             <a:endParaRPr lang="en-US"/>
           </a:p>
@@ -2073,10 +2057,9 @@
           </a:lstStyle>
           <a:p>
             <a:r>
-              <a:rPr lang="en-US" smtClean="0"/>
+              <a:rPr lang="en-US"/>
               <a:t>Click to edit Master title style</a:t>
             </a:r>
-            <a:endParaRPr lang="en-US"/>
           </a:p>
         </p:txBody>
       </p:sp>
@@ -2130,38 +2113,37 @@
           <a:p>
             <a:pPr lvl="0"/>
             <a:r>
-              <a:rPr lang="en-US" smtClean="0"/>
+              <a:rPr lang="en-US"/>
               <a:t>Click to edit Master text styles</a:t>
             </a:r>
           </a:p>
           <a:p>
             <a:pPr lvl="1"/>
             <a:r>
-              <a:rPr lang="en-US" smtClean="0"/>
+              <a:rPr lang="en-US"/>
               <a:t>Second level</a:t>
             </a:r>
           </a:p>
           <a:p>
             <a:pPr lvl="2"/>
             <a:r>
-              <a:rPr lang="en-US" smtClean="0"/>
+              <a:rPr lang="en-US"/>
               <a:t>Third level</a:t>
             </a:r>
           </a:p>
           <a:p>
             <a:pPr lvl="3"/>
             <a:r>
-              <a:rPr lang="en-US" smtClean="0"/>
+              <a:rPr lang="en-US"/>
               <a:t>Fourth level</a:t>
             </a:r>
           </a:p>
           <a:p>
             <a:pPr lvl="4"/>
             <a:r>
-              <a:rPr lang="en-US" smtClean="0"/>
+              <a:rPr lang="en-US"/>
               <a:t>Fifth level</a:t>
             </a:r>
-            <a:endParaRPr lang="en-US"/>
           </a:p>
         </p:txBody>
       </p:sp>
@@ -2224,7 +2206,7 @@
           <a:p>
             <a:pPr lvl="0"/>
             <a:r>
-              <a:rPr lang="en-US" smtClean="0"/>
+              <a:rPr lang="en-US"/>
               <a:t>Click to edit Master text styles</a:t>
             </a:r>
           </a:p>
@@ -2248,7 +2230,7 @@
             <a:fld id="{D116347B-99F7-7648-82D0-435612AEDE7B}" type="datetimeFigureOut">
               <a:rPr lang="en-US" smtClean="0"/>
               <a:pPr/>
-              <a:t>10/3/17</a:t>
+              <a:t>7/30/19</a:t>
             </a:fld>
             <a:endParaRPr lang="en-US"/>
           </a:p>
@@ -2347,10 +2329,9 @@
           </a:lstStyle>
           <a:p>
             <a:r>
-              <a:rPr lang="en-US" smtClean="0"/>
+              <a:rPr lang="en-US"/>
               <a:t>Click to edit Master title style</a:t>
             </a:r>
-            <a:endParaRPr lang="en-US"/>
           </a:p>
         </p:txBody>
       </p:sp>
@@ -2474,7 +2455,7 @@
           <a:p>
             <a:pPr lvl="0"/>
             <a:r>
-              <a:rPr lang="en-US" smtClean="0"/>
+              <a:rPr lang="en-US"/>
               <a:t>Click to edit Master text styles</a:t>
             </a:r>
           </a:p>
@@ -2498,7 +2479,7 @@
             <a:fld id="{D116347B-99F7-7648-82D0-435612AEDE7B}" type="datetimeFigureOut">
               <a:rPr lang="en-US" smtClean="0"/>
               <a:pPr/>
-              <a:t>10/3/17</a:t>
+              <a:t>7/30/19</a:t>
             </a:fld>
             <a:endParaRPr lang="en-US"/>
           </a:p>
@@ -2603,10 +2584,9 @@
           <a:lstStyle/>
           <a:p>
             <a:r>
-              <a:rPr lang="en-US" smtClean="0"/>
+              <a:rPr lang="en-US"/>
               <a:t>Click to edit Master title style</a:t>
             </a:r>
-            <a:endParaRPr lang="en-US"/>
           </a:p>
         </p:txBody>
       </p:sp>
@@ -2637,38 +2617,37 @@
           <a:p>
             <a:pPr lvl="0"/>
             <a:r>
-              <a:rPr lang="en-US" smtClean="0"/>
+              <a:rPr lang="en-US"/>
               <a:t>Click to edit Master text styles</a:t>
             </a:r>
           </a:p>
           <a:p>
             <a:pPr lvl="1"/>
             <a:r>
-              <a:rPr lang="en-US" smtClean="0"/>
+              <a:rPr lang="en-US"/>
               <a:t>Second level</a:t>
             </a:r>
           </a:p>
           <a:p>
             <a:pPr lvl="2"/>
             <a:r>
-              <a:rPr lang="en-US" smtClean="0"/>
+              <a:rPr lang="en-US"/>
               <a:t>Third level</a:t>
             </a:r>
           </a:p>
           <a:p>
             <a:pPr lvl="3"/>
             <a:r>
-              <a:rPr lang="en-US" smtClean="0"/>
+              <a:rPr lang="en-US"/>
               <a:t>Fourth level</a:t>
             </a:r>
           </a:p>
           <a:p>
             <a:pPr lvl="4"/>
             <a:r>
-              <a:rPr lang="en-US" smtClean="0"/>
+              <a:rPr lang="en-US"/>
               <a:t>Fifth level</a:t>
             </a:r>
-            <a:endParaRPr lang="en-US"/>
           </a:p>
         </p:txBody>
       </p:sp>
@@ -2708,7 +2687,7 @@
             <a:fld id="{D116347B-99F7-7648-82D0-435612AEDE7B}" type="datetimeFigureOut">
               <a:rPr lang="en-US" smtClean="0"/>
               <a:pPr/>
-              <a:t>10/3/17</a:t>
+              <a:t>7/30/19</a:t>
             </a:fld>
             <a:endParaRPr lang="en-US"/>
           </a:p>
@@ -3132,13 +3111,6 @@
   <p:clrMapOvr>
     <a:masterClrMapping/>
   </p:clrMapOvr>
-  <p:timing>
-    <p:tnLst>
-      <p:par>
-        <p:cTn id="1" dur="indefinite" restart="never" nodeType="tmRoot"/>
-      </p:par>
-    </p:tnLst>
-  </p:timing>
 </p:sld>
 </file>
 
@@ -3206,10 +3178,9 @@
           <a:lstStyle/>
           <a:p>
             <a:r>
-              <a:rPr lang="en-US" dirty="0" smtClean="0"/>
+              <a:rPr lang="en-US" dirty="0"/>
               <a:t>match(                            ,                                )</a:t>
             </a:r>
-            <a:endParaRPr lang="en-US" dirty="0"/>
           </a:p>
         </p:txBody>
       </p:sp>
@@ -3387,39 +3358,40 @@
           <a:lstStyle/>
           <a:p>
             <a:r>
-              <a:rPr lang="en-US" dirty="0" smtClean="0"/>
+              <a:rPr lang="en-US" dirty="0"/>
               <a:t>match(  </a:t>
             </a:r>
             <a:r>
-              <a:rPr lang="en-US" dirty="0" err="1" smtClean="0"/>
+              <a:rPr lang="en-US" dirty="0" err="1"/>
               <a:t>Kdata$orfname</a:t>
             </a:r>
             <a:r>
-              <a:rPr lang="en-US" dirty="0" smtClean="0"/>
+              <a:rPr lang="en-US" dirty="0"/>
               <a:t> ,   </a:t>
             </a:r>
             <a:r>
-              <a:rPr lang="en-US" dirty="0" err="1" smtClean="0"/>
+              <a:rPr lang="en-US" dirty="0" err="1"/>
               <a:t>Net$id</a:t>
             </a:r>
             <a:r>
-              <a:rPr lang="en-US" dirty="0" smtClean="0"/>
+              <a:rPr lang="en-US" dirty="0"/>
               <a:t>   )</a:t>
             </a:r>
-            <a:endParaRPr lang="en-US" dirty="0"/>
           </a:p>
         </p:txBody>
       </p:sp>
       <p:cxnSp>
         <p:nvCxnSpPr>
           <p:cNvPr id="23" name="Curved Connector 22"/>
-          <p:cNvCxnSpPr/>
+          <p:cNvCxnSpPr>
+            <a:cxnSpLocks/>
+          </p:cNvCxnSpPr>
           <p:nvPr/>
         </p:nvCxnSpPr>
         <p:spPr>
           <a:xfrm>
             <a:off x="4538133" y="2336800"/>
-            <a:ext cx="1386947" cy="1016000"/>
+            <a:ext cx="1386947" cy="608419"/>
           </a:xfrm>
           <a:prstGeom prst="curvedConnector3">
             <a:avLst>
@@ -3773,43 +3745,44 @@
           <a:lstStyle/>
           <a:p>
             <a:r>
-              <a:rPr lang="en-US" dirty="0" err="1" smtClean="0"/>
+              <a:rPr lang="en-US" dirty="0" err="1"/>
               <a:t>Net$Freq[match</a:t>
             </a:r>
             <a:r>
-              <a:rPr lang="en-US" dirty="0" smtClean="0"/>
+              <a:rPr lang="en-US" dirty="0"/>
               <a:t>(  </a:t>
             </a:r>
             <a:r>
-              <a:rPr lang="en-US" dirty="0" err="1" smtClean="0"/>
+              <a:rPr lang="en-US" dirty="0" err="1"/>
               <a:t>Kdata$orfname</a:t>
             </a:r>
             <a:r>
-              <a:rPr lang="en-US" dirty="0" smtClean="0"/>
+              <a:rPr lang="en-US" dirty="0"/>
               <a:t> ,   </a:t>
             </a:r>
             <a:r>
-              <a:rPr lang="en-US" dirty="0" err="1" smtClean="0"/>
+              <a:rPr lang="en-US" dirty="0" err="1"/>
               <a:t>Net$id</a:t>
             </a:r>
             <a:r>
-              <a:rPr lang="en-US" dirty="0" smtClean="0"/>
+              <a:rPr lang="en-US" dirty="0"/>
               <a:t>   )]</a:t>
             </a:r>
-            <a:endParaRPr lang="en-US" dirty="0"/>
           </a:p>
         </p:txBody>
       </p:sp>
       <p:cxnSp>
         <p:nvCxnSpPr>
           <p:cNvPr id="23" name="Curved Connector 22"/>
-          <p:cNvCxnSpPr/>
+          <p:cNvCxnSpPr>
+            <a:cxnSpLocks/>
+          </p:cNvCxnSpPr>
           <p:nvPr/>
         </p:nvCxnSpPr>
         <p:spPr>
           <a:xfrm>
             <a:off x="4538133" y="2336800"/>
-            <a:ext cx="1386947" cy="1016000"/>
+            <a:ext cx="1386947" cy="516467"/>
           </a:xfrm>
           <a:prstGeom prst="curvedConnector3">
             <a:avLst>
@@ -4163,51 +4136,52 @@
           <a:lstStyle/>
           <a:p>
             <a:r>
-              <a:rPr lang="en-US" dirty="0" err="1" smtClean="0"/>
+              <a:rPr lang="en-US" dirty="0" err="1"/>
               <a:t>Kdata$degree</a:t>
             </a:r>
             <a:r>
-              <a:rPr lang="en-US" dirty="0" smtClean="0"/>
+              <a:rPr lang="en-US" dirty="0"/>
               <a:t> = </a:t>
             </a:r>
             <a:r>
-              <a:rPr lang="en-US" dirty="0" err="1" smtClean="0"/>
+              <a:rPr lang="en-US" dirty="0" err="1"/>
               <a:t>Net$Freq[match</a:t>
             </a:r>
             <a:r>
-              <a:rPr lang="en-US" dirty="0" smtClean="0"/>
+              <a:rPr lang="en-US" dirty="0"/>
               <a:t>(  </a:t>
             </a:r>
             <a:r>
-              <a:rPr lang="en-US" dirty="0" err="1" smtClean="0"/>
+              <a:rPr lang="en-US" dirty="0" err="1"/>
               <a:t>Kdata$orfname</a:t>
             </a:r>
             <a:r>
-              <a:rPr lang="en-US" dirty="0" smtClean="0"/>
+              <a:rPr lang="en-US" dirty="0"/>
               <a:t> ,   </a:t>
             </a:r>
             <a:r>
-              <a:rPr lang="en-US" dirty="0" err="1" smtClean="0"/>
+              <a:rPr lang="en-US" dirty="0" err="1"/>
               <a:t>Net$id</a:t>
             </a:r>
             <a:r>
-              <a:rPr lang="en-US" dirty="0" smtClean="0"/>
+              <a:rPr lang="en-US" dirty="0"/>
               <a:t>   )]</a:t>
             </a:r>
-            <a:endParaRPr lang="en-US" dirty="0"/>
           </a:p>
         </p:txBody>
       </p:sp>
       <p:cxnSp>
         <p:nvCxnSpPr>
           <p:cNvPr id="23" name="Curved Connector 22"/>
-          <p:cNvCxnSpPr/>
+          <p:cNvCxnSpPr>
+            <a:cxnSpLocks/>
+          </p:cNvCxnSpPr>
           <p:nvPr/>
         </p:nvCxnSpPr>
         <p:spPr>
           <a:xfrm>
             <a:off x="4538133" y="2336800"/>
-            <a:ext cx="1386947" cy="1016000"/>
+            <a:ext cx="1386947" cy="516467"/>
           </a:xfrm>
           <a:prstGeom prst="curvedConnector3">
             <a:avLst>

</xml_diff>